<commit_message>
edit UI component diagram
</commit_message>
<xml_diff>
--- a/docs/diagrams/Diagrams.pptx
+++ b/docs/diagrams/Diagrams.pptx
@@ -116,6 +116,22 @@
       </a:defRPr>
     </a:lvl9pPr>
   </p:defaultTextStyle>
+  <p:extLst>
+    <p:ext uri="{EFAFB233-063F-42B5-8137-9DF3F51BA10A}">
+      <p15:sldGuideLst xmlns:p15="http://schemas.microsoft.com/office/powerpoint/2012/main">
+        <p15:guide id="1" orient="horz" pos="1488">
+          <p15:clr>
+            <a:srgbClr val="A4A3A4"/>
+          </p15:clr>
+        </p15:guide>
+        <p15:guide id="2" pos="2880">
+          <p15:clr>
+            <a:srgbClr val="A4A3A4"/>
+          </p15:clr>
+        </p15:guide>
+      </p15:sldGuideLst>
+    </p:ext>
+  </p:extLst>
 </p:presentation>
 </file>
 
@@ -201,7 +217,7 @@
           <a:p>
             <a:fld id="{F5CC4B3F-88C1-4FFA-B1B6-F41C21DC6924}" type="datetimeFigureOut">
               <a:rPr lang="en-US" smtClean="0"/>
-              <a:t>10/26/2016</a:t>
+              <a:t>10/29/2016</a:t>
             </a:fld>
             <a:endParaRPr lang="en-US"/>
           </a:p>
@@ -650,7 +666,7 @@
           <a:p>
             <a:fld id="{78C97017-6FC3-485B-9764-EAC9E56C1D49}" type="datetimeFigureOut">
               <a:rPr lang="en-US" smtClean="0"/>
-              <a:t>10/26/2016</a:t>
+              <a:t>10/29/2016</a:t>
             </a:fld>
             <a:endParaRPr lang="en-US"/>
           </a:p>
@@ -820,7 +836,7 @@
           <a:p>
             <a:fld id="{78C97017-6FC3-485B-9764-EAC9E56C1D49}" type="datetimeFigureOut">
               <a:rPr lang="en-US" smtClean="0"/>
-              <a:t>10/26/2016</a:t>
+              <a:t>10/29/2016</a:t>
             </a:fld>
             <a:endParaRPr lang="en-US"/>
           </a:p>
@@ -1000,7 +1016,7 @@
           <a:p>
             <a:fld id="{78C97017-6FC3-485B-9764-EAC9E56C1D49}" type="datetimeFigureOut">
               <a:rPr lang="en-US" smtClean="0"/>
-              <a:t>10/26/2016</a:t>
+              <a:t>10/29/2016</a:t>
             </a:fld>
             <a:endParaRPr lang="en-US"/>
           </a:p>
@@ -1170,7 +1186,7 @@
           <a:p>
             <a:fld id="{78C97017-6FC3-485B-9764-EAC9E56C1D49}" type="datetimeFigureOut">
               <a:rPr lang="en-US" smtClean="0"/>
-              <a:t>10/26/2016</a:t>
+              <a:t>10/29/2016</a:t>
             </a:fld>
             <a:endParaRPr lang="en-US"/>
           </a:p>
@@ -1416,7 +1432,7 @@
           <a:p>
             <a:fld id="{78C97017-6FC3-485B-9764-EAC9E56C1D49}" type="datetimeFigureOut">
               <a:rPr lang="en-US" smtClean="0"/>
-              <a:t>10/26/2016</a:t>
+              <a:t>10/29/2016</a:t>
             </a:fld>
             <a:endParaRPr lang="en-US"/>
           </a:p>
@@ -1704,7 +1720,7 @@
           <a:p>
             <a:fld id="{78C97017-6FC3-485B-9764-EAC9E56C1D49}" type="datetimeFigureOut">
               <a:rPr lang="en-US" smtClean="0"/>
-              <a:t>10/26/2016</a:t>
+              <a:t>10/29/2016</a:t>
             </a:fld>
             <a:endParaRPr lang="en-US"/>
           </a:p>
@@ -2126,7 +2142,7 @@
           <a:p>
             <a:fld id="{78C97017-6FC3-485B-9764-EAC9E56C1D49}" type="datetimeFigureOut">
               <a:rPr lang="en-US" smtClean="0"/>
-              <a:t>10/26/2016</a:t>
+              <a:t>10/29/2016</a:t>
             </a:fld>
             <a:endParaRPr lang="en-US"/>
           </a:p>
@@ -2244,7 +2260,7 @@
           <a:p>
             <a:fld id="{78C97017-6FC3-485B-9764-EAC9E56C1D49}" type="datetimeFigureOut">
               <a:rPr lang="en-US" smtClean="0"/>
-              <a:t>10/26/2016</a:t>
+              <a:t>10/29/2016</a:t>
             </a:fld>
             <a:endParaRPr lang="en-US"/>
           </a:p>
@@ -2339,7 +2355,7 @@
           <a:p>
             <a:fld id="{78C97017-6FC3-485B-9764-EAC9E56C1D49}" type="datetimeFigureOut">
               <a:rPr lang="en-US" smtClean="0"/>
-              <a:t>10/26/2016</a:t>
+              <a:t>10/29/2016</a:t>
             </a:fld>
             <a:endParaRPr lang="en-US"/>
           </a:p>
@@ -2616,7 +2632,7 @@
           <a:p>
             <a:fld id="{78C97017-6FC3-485B-9764-EAC9E56C1D49}" type="datetimeFigureOut">
               <a:rPr lang="en-US" smtClean="0"/>
-              <a:t>10/26/2016</a:t>
+              <a:t>10/29/2016</a:t>
             </a:fld>
             <a:endParaRPr lang="en-US"/>
           </a:p>
@@ -2869,7 +2885,7 @@
           <a:p>
             <a:fld id="{78C97017-6FC3-485B-9764-EAC9E56C1D49}" type="datetimeFigureOut">
               <a:rPr lang="en-US" smtClean="0"/>
-              <a:t>10/26/2016</a:t>
+              <a:t>10/29/2016</a:t>
             </a:fld>
             <a:endParaRPr lang="en-US"/>
           </a:p>
@@ -3082,7 +3098,7 @@
           <a:p>
             <a:fld id="{78C97017-6FC3-485B-9764-EAC9E56C1D49}" type="datetimeFigureOut">
               <a:rPr lang="en-US" smtClean="0"/>
-              <a:t>10/26/2016</a:t>
+              <a:t>10/29/2016</a:t>
             </a:fld>
             <a:endParaRPr lang="en-US"/>
           </a:p>
@@ -8041,14 +8057,14 @@
           <a:p>
             <a:pPr algn="ctr"/>
             <a:r>
-              <a:rPr lang="en-US" sz="1050" b="1" dirty="0" err="1">
+              <a:rPr lang="en-US" sz="1050" b="1" smtClean="0">
                 <a:solidFill>
                   <a:schemeClr val="accent3">
                     <a:lumMod val="75000"/>
                   </a:schemeClr>
                 </a:solidFill>
               </a:rPr>
-              <a:t>BrowserPanel</a:t>
+              <a:t>DisplayPanel</a:t>
             </a:r>
             <a:endParaRPr lang="en-SG" sz="1050" b="1" dirty="0">
               <a:solidFill>

</xml_diff>